<commit_message>
nouvelle version fichier presentation
</commit_message>
<xml_diff>
--- a/conception/presentation/Presentation_teams_vampire.pptx
+++ b/conception/presentation/Presentation_teams_vampire.pptx
@@ -7,12 +7,13 @@
   <p:sldIdLst>
     <p:sldId id="256" r:id="rId2"/>
     <p:sldId id="265" r:id="rId3"/>
-    <p:sldId id="264" r:id="rId4"/>
-    <p:sldId id="266" r:id="rId5"/>
-    <p:sldId id="267" r:id="rId6"/>
-    <p:sldId id="268" r:id="rId7"/>
-    <p:sldId id="269" r:id="rId8"/>
-    <p:sldId id="270" r:id="rId9"/>
+    <p:sldId id="271" r:id="rId4"/>
+    <p:sldId id="264" r:id="rId5"/>
+    <p:sldId id="266" r:id="rId6"/>
+    <p:sldId id="267" r:id="rId7"/>
+    <p:sldId id="268" r:id="rId8"/>
+    <p:sldId id="269" r:id="rId9"/>
+    <p:sldId id="270" r:id="rId10"/>
   </p:sldIdLst>
   <p:sldSz cx="12192000" cy="6858000"/>
   <p:notesSz cx="6858000" cy="9144000"/>
@@ -113,7 +114,7 @@
   </p:defaultTextStyle>
   <p:extLst>
     <p:ext uri="{EFAFB233-063F-42B5-8137-9DF3F51BA10A}">
-      <p15:sldGuideLst xmlns:p15="http://schemas.microsoft.com/office/powerpoint/2012/main"/>
+      <p15:sldGuideLst xmlns:p15="http://schemas.microsoft.com/office/powerpoint/2012/main" xmlns=""/>
     </p:ext>
   </p:extLst>
 </p:presentation>
@@ -282,7 +283,8 @@
           <a:p>
             <a:fld id="{1160EA64-D806-43AC-9DF2-F8C432F32B4C}" type="datetimeFigureOut">
               <a:rPr lang="en-US" dirty="0"/>
-              <a:t>3/21/24</a:t>
+              <a:pPr/>
+              <a:t>3/21/2024</a:t>
             </a:fld>
             <a:endParaRPr lang="en-US" dirty="0"/>
           </a:p>
@@ -325,7 +327,7 @@
             <a:fld id="{8A7A6979-0714-4377-B894-6BE4C2D6E202}" type="slidenum">
               <a:rPr lang="en-US" dirty="0"/>
               <a:pPr/>
-              <a:t>‹#›</a:t>
+              <a:t>‹N°›</a:t>
             </a:fld>
             <a:endParaRPr lang="en-US" dirty="0"/>
           </a:p>
@@ -448,7 +450,8 @@
           <a:p>
             <a:fld id="{E9F9C37B-1D36-470B-8223-D6C91242EC14}" type="datetimeFigureOut">
               <a:rPr lang="en-US" dirty="0"/>
-              <a:t>3/21/24</a:t>
+              <a:pPr/>
+              <a:t>3/21/2024</a:t>
             </a:fld>
             <a:endParaRPr lang="en-US" dirty="0"/>
           </a:p>
@@ -490,7 +493,8 @@
           <a:p>
             <a:fld id="{8A7A6979-0714-4377-B894-6BE4C2D6E202}" type="slidenum">
               <a:rPr lang="en-US" dirty="0"/>
-              <a:t>‹#›</a:t>
+              <a:pPr/>
+              <a:t>‹N°›</a:t>
             </a:fld>
             <a:endParaRPr lang="en-US" dirty="0"/>
           </a:p>
@@ -623,7 +627,8 @@
           <a:p>
             <a:fld id="{67C6F52A-A82B-47A2-A83A-8C4C91F2D59F}" type="datetimeFigureOut">
               <a:rPr lang="en-US" dirty="0"/>
-              <a:t>3/21/24</a:t>
+              <a:pPr/>
+              <a:t>3/21/2024</a:t>
             </a:fld>
             <a:endParaRPr lang="en-US" dirty="0"/>
           </a:p>
@@ -665,7 +670,8 @@
           <a:p>
             <a:fld id="{8A7A6979-0714-4377-B894-6BE4C2D6E202}" type="slidenum">
               <a:rPr lang="en-US" dirty="0"/>
-              <a:t>‹#›</a:t>
+              <a:pPr/>
+              <a:t>‹N°›</a:t>
             </a:fld>
             <a:endParaRPr lang="en-US" dirty="0"/>
           </a:p>
@@ -788,7 +794,8 @@
           <a:p>
             <a:fld id="{F070A7B3-6521-4DCA-87E5-044747A908C1}" type="datetimeFigureOut">
               <a:rPr lang="en-US" dirty="0"/>
-              <a:t>3/21/24</a:t>
+              <a:pPr/>
+              <a:t>3/21/2024</a:t>
             </a:fld>
             <a:endParaRPr lang="en-US" dirty="0"/>
           </a:p>
@@ -831,7 +838,7 @@
             <a:fld id="{8A7A6979-0714-4377-B894-6BE4C2D6E202}" type="slidenum">
               <a:rPr lang="en-US" dirty="0"/>
               <a:pPr/>
-              <a:t>‹#›</a:t>
+              <a:t>‹N°›</a:t>
             </a:fld>
             <a:endParaRPr lang="en-US" dirty="0"/>
           </a:p>
@@ -1052,7 +1059,8 @@
           <a:p>
             <a:fld id="{1160EA64-D806-43AC-9DF2-F8C432F32B4C}" type="datetimeFigureOut">
               <a:rPr lang="en-US" dirty="0"/>
-              <a:t>3/21/24</a:t>
+              <a:pPr/>
+              <a:t>3/21/2024</a:t>
             </a:fld>
             <a:endParaRPr lang="en-US" dirty="0"/>
           </a:p>
@@ -1095,7 +1103,7 @@
             <a:fld id="{8A7A6979-0714-4377-B894-6BE4C2D6E202}" type="slidenum">
               <a:rPr lang="en-US" dirty="0"/>
               <a:pPr/>
-              <a:t>‹#›</a:t>
+              <a:t>‹N°›</a:t>
             </a:fld>
             <a:endParaRPr lang="en-US" dirty="0"/>
           </a:p>
@@ -1280,7 +1288,8 @@
           <a:p>
             <a:fld id="{AB134690-1557-4C89-A502-4959FE7FAD70}" type="datetimeFigureOut">
               <a:rPr lang="en-US" dirty="0"/>
-              <a:t>3/21/24</a:t>
+              <a:pPr/>
+              <a:t>3/21/2024</a:t>
             </a:fld>
             <a:endParaRPr lang="en-US" dirty="0"/>
           </a:p>
@@ -1322,7 +1331,8 @@
           <a:p>
             <a:fld id="{8A7A6979-0714-4377-B894-6BE4C2D6E202}" type="slidenum">
               <a:rPr lang="en-US" dirty="0"/>
-              <a:t>‹#›</a:t>
+              <a:pPr/>
+              <a:t>‹N°›</a:t>
             </a:fld>
             <a:endParaRPr lang="en-US" dirty="0"/>
           </a:p>
@@ -1634,7 +1644,8 @@
           <a:p>
             <a:fld id="{4F7D4976-E339-4826-83B7-FBD03F55ECF8}" type="datetimeFigureOut">
               <a:rPr lang="en-US" dirty="0"/>
-              <a:t>3/21/24</a:t>
+              <a:pPr/>
+              <a:t>3/21/2024</a:t>
             </a:fld>
             <a:endParaRPr lang="en-US" dirty="0"/>
           </a:p>
@@ -1676,7 +1687,8 @@
           <a:p>
             <a:fld id="{8A7A6979-0714-4377-B894-6BE4C2D6E202}" type="slidenum">
               <a:rPr lang="en-US" dirty="0"/>
-              <a:t>‹#›</a:t>
+              <a:pPr/>
+              <a:t>‹N°›</a:t>
             </a:fld>
             <a:endParaRPr lang="en-US" dirty="0"/>
           </a:p>
@@ -1770,7 +1782,8 @@
           <a:p>
             <a:fld id="{E1037C31-9E7A-4F99-8774-A0E530DE1A42}" type="datetimeFigureOut">
               <a:rPr lang="en-US" dirty="0"/>
-              <a:t>3/21/24</a:t>
+              <a:pPr/>
+              <a:t>3/21/2024</a:t>
             </a:fld>
             <a:endParaRPr lang="en-US" dirty="0"/>
           </a:p>
@@ -1812,7 +1825,8 @@
           <a:p>
             <a:fld id="{8A7A6979-0714-4377-B894-6BE4C2D6E202}" type="slidenum">
               <a:rPr lang="en-US" dirty="0"/>
-              <a:t>‹#›</a:t>
+              <a:pPr/>
+              <a:t>‹N°›</a:t>
             </a:fld>
             <a:endParaRPr lang="en-US" dirty="0"/>
           </a:p>
@@ -1860,7 +1874,8 @@
           <a:p>
             <a:fld id="{C278504F-A551-4DE0-9316-4DCD1D8CC752}" type="datetimeFigureOut">
               <a:rPr lang="en-US" dirty="0"/>
-              <a:t>3/21/24</a:t>
+              <a:pPr/>
+              <a:t>3/21/2024</a:t>
             </a:fld>
             <a:endParaRPr lang="en-US" dirty="0"/>
           </a:p>
@@ -1902,7 +1917,8 @@
           <a:p>
             <a:fld id="{8A7A6979-0714-4377-B894-6BE4C2D6E202}" type="slidenum">
               <a:rPr lang="en-US" dirty="0"/>
-              <a:t>‹#›</a:t>
+              <a:pPr/>
+              <a:t>‹N°›</a:t>
             </a:fld>
             <a:endParaRPr lang="en-US" dirty="0"/>
           </a:p>
@@ -2212,7 +2228,8 @@
           <a:p>
             <a:fld id="{D1BE4249-C0D0-4B06-8692-E8BB871AF643}" type="datetimeFigureOut">
               <a:rPr lang="en-US" dirty="0"/>
-              <a:t>3/21/24</a:t>
+              <a:pPr/>
+              <a:t>3/21/2024</a:t>
             </a:fld>
             <a:endParaRPr lang="en-US" dirty="0"/>
           </a:p>
@@ -2269,7 +2286,8 @@
           <a:p>
             <a:fld id="{8A7A6979-0714-4377-B894-6BE4C2D6E202}" type="slidenum">
               <a:rPr lang="en-US" dirty="0"/>
-              <a:t>‹#›</a:t>
+              <a:pPr/>
+              <a:t>‹N°›</a:t>
             </a:fld>
             <a:endParaRPr lang="en-US" dirty="0"/>
           </a:p>
@@ -2564,7 +2582,8 @@
           <a:p>
             <a:fld id="{042B0DB6-F5C7-45FB-8CF3-31B45F9C2DAC}" type="datetimeFigureOut">
               <a:rPr lang="en-US" dirty="0"/>
-              <a:t>3/21/24</a:t>
+              <a:pPr/>
+              <a:t>3/21/2024</a:t>
             </a:fld>
             <a:endParaRPr lang="en-US" dirty="0"/>
           </a:p>
@@ -2621,7 +2640,8 @@
           <a:p>
             <a:fld id="{8A7A6979-0714-4377-B894-6BE4C2D6E202}" type="slidenum">
               <a:rPr lang="en-US" dirty="0"/>
-              <a:t>‹#›</a:t>
+              <a:pPr/>
+              <a:t>‹N°›</a:t>
             </a:fld>
             <a:endParaRPr lang="en-US" dirty="0"/>
           </a:p>
@@ -2801,7 +2821,8 @@
           <a:p>
             <a:fld id="{1160EA64-D806-43AC-9DF2-F8C432F32B4C}" type="datetimeFigureOut">
               <a:rPr lang="en-US" dirty="0"/>
-              <a:t>3/21/24</a:t>
+              <a:pPr/>
+              <a:t>3/21/2024</a:t>
             </a:fld>
             <a:endParaRPr lang="en-US" dirty="0"/>
           </a:p>
@@ -2885,7 +2906,7 @@
             <a:fld id="{8A7A6979-0714-4377-B894-6BE4C2D6E202}" type="slidenum">
               <a:rPr lang="en-US" dirty="0"/>
               <a:pPr/>
-              <a:t>‹#›</a:t>
+              <a:t>‹N°›</a:t>
             </a:fld>
             <a:endParaRPr lang="en-US" dirty="0"/>
           </a:p>
@@ -3255,7 +3276,7 @@
           <p:cNvPr id="2" name="Title 1">
             <a:extLst>
               <a:ext uri="{FF2B5EF4-FFF2-40B4-BE49-F238E27FC236}">
-                <a16:creationId xmlns:a16="http://schemas.microsoft.com/office/drawing/2014/main" id="{00A839E6-E2EC-FD43-9FEF-AB790772D9D3}"/>
+                <a16:creationId xmlns:a16="http://schemas.microsoft.com/office/drawing/2014/main" xmlns="" id="{00A839E6-E2EC-FD43-9FEF-AB790772D9D3}"/>
               </a:ext>
             </a:extLst>
           </p:cNvPr>
@@ -3283,7 +3304,7 @@
           <p:cNvPr id="3" name="Subtitle 2">
             <a:extLst>
               <a:ext uri="{FF2B5EF4-FFF2-40B4-BE49-F238E27FC236}">
-                <a16:creationId xmlns:a16="http://schemas.microsoft.com/office/drawing/2014/main" id="{F59E5260-A9D2-4C49-9B79-F7D511B31EBB}"/>
+                <a16:creationId xmlns:a16="http://schemas.microsoft.com/office/drawing/2014/main" xmlns="" id="{F59E5260-A9D2-4C49-9B79-F7D511B31EBB}"/>
               </a:ext>
             </a:extLst>
           </p:cNvPr>
@@ -3314,7 +3335,7 @@
     </p:spTree>
     <p:extLst>
       <p:ext uri="{BB962C8B-B14F-4D97-AF65-F5344CB8AC3E}">
-        <p14:creationId xmlns:p14="http://schemas.microsoft.com/office/powerpoint/2010/main" val="906894890"/>
+        <p14:creationId xmlns:p14="http://schemas.microsoft.com/office/powerpoint/2010/main" xmlns="" val="906894890"/>
       </p:ext>
     </p:extLst>
   </p:cSld>
@@ -3346,7 +3367,7 @@
           <p:cNvPr id="2" name="Title 1">
             <a:extLst>
               <a:ext uri="{FF2B5EF4-FFF2-40B4-BE49-F238E27FC236}">
-                <a16:creationId xmlns:a16="http://schemas.microsoft.com/office/drawing/2014/main" id="{9D96E17F-1028-D148-B189-83F9A4C1FE73}"/>
+                <a16:creationId xmlns:a16="http://schemas.microsoft.com/office/drawing/2014/main" xmlns="" id="{9D96E17F-1028-D148-B189-83F9A4C1FE73}"/>
               </a:ext>
             </a:extLst>
           </p:cNvPr>
@@ -3374,7 +3395,7 @@
           <p:cNvPr id="3" name="Content Placeholder 2">
             <a:extLst>
               <a:ext uri="{FF2B5EF4-FFF2-40B4-BE49-F238E27FC236}">
-                <a16:creationId xmlns:a16="http://schemas.microsoft.com/office/drawing/2014/main" id="{D3FD2D07-15CF-9040-A7E1-69E533E8A54C}"/>
+                <a16:creationId xmlns:a16="http://schemas.microsoft.com/office/drawing/2014/main" xmlns="" id="{D3FD2D07-15CF-9040-A7E1-69E533E8A54C}"/>
               </a:ext>
             </a:extLst>
           </p:cNvPr>
@@ -3428,7 +3449,7 @@
     </p:spTree>
     <p:extLst>
       <p:ext uri="{BB962C8B-B14F-4D97-AF65-F5344CB8AC3E}">
-        <p14:creationId xmlns:p14="http://schemas.microsoft.com/office/powerpoint/2010/main" val="4199062536"/>
+        <p14:creationId xmlns:p14="http://schemas.microsoft.com/office/powerpoint/2010/main" xmlns="" val="4199062536"/>
       </p:ext>
     </p:extLst>
   </p:cSld>
@@ -3457,13 +3478,7 @@
       </p:grpSpPr>
       <p:sp>
         <p:nvSpPr>
-          <p:cNvPr id="2" name="Title 1">
-            <a:extLst>
-              <a:ext uri="{FF2B5EF4-FFF2-40B4-BE49-F238E27FC236}">
-                <a16:creationId xmlns:a16="http://schemas.microsoft.com/office/drawing/2014/main" id="{04780F8B-A673-5E46-B69D-90970069CAED}"/>
-              </a:ext>
-            </a:extLst>
-          </p:cNvPr>
+          <p:cNvPr id="2" name="Titre 1"/>
           <p:cNvSpPr>
             <a:spLocks noGrp="1"/>
           </p:cNvSpPr>
@@ -3473,8 +3488,8 @@
         </p:nvSpPr>
         <p:spPr>
           <a:xfrm>
-            <a:off x="2231136" y="258637"/>
-            <a:ext cx="7729728" cy="1188720"/>
+            <a:off x="2231136" y="169562"/>
+            <a:ext cx="7729728" cy="943621"/>
           </a:xfrm>
         </p:spPr>
         <p:txBody>
@@ -3482,21 +3497,20 @@
           <a:lstStyle/>
           <a:p>
             <a:r>
-              <a:rPr lang="fr-FR" dirty="0"/>
-              <a:t>SUJET</a:t>
-            </a:r>
+              <a:rPr lang="fr-FR" dirty="0" smtClean="0"/>
+              <a:t>Dictionnaire des </a:t>
+            </a:r>
+            <a:r>
+              <a:rPr lang="fr-FR" dirty="0" err="1" smtClean="0"/>
+              <a:t>donnees</a:t>
+            </a:r>
+            <a:endParaRPr lang="fr-FR" dirty="0"/>
           </a:p>
         </p:txBody>
       </p:sp>
       <p:pic>
         <p:nvPicPr>
-          <p:cNvPr id="5" name="Content Placeholder 4">
-            <a:extLst>
-              <a:ext uri="{FF2B5EF4-FFF2-40B4-BE49-F238E27FC236}">
-                <a16:creationId xmlns:a16="http://schemas.microsoft.com/office/drawing/2014/main" id="{C5BF60A7-1156-054E-B914-DC41B3F8E5BF}"/>
-              </a:ext>
-            </a:extLst>
-          </p:cNvPr>
+          <p:cNvPr id="4" name="Espace réservé du contenu 3" descr="WhatsApp Image 2024-03-21 à 03.59.31_9648614f.jpg"/>
           <p:cNvPicPr>
             <a:picLocks noGrp="1" noChangeAspect="1"/>
           </p:cNvPicPr>
@@ -3512,17 +3526,12 @@
         </p:blipFill>
         <p:spPr>
           <a:xfrm>
-            <a:off x="891251" y="2002421"/>
-            <a:ext cx="9722734" cy="4855580"/>
+            <a:off x="715617" y="1272209"/>
+            <a:ext cx="10296939" cy="5340626"/>
           </a:xfrm>
         </p:spPr>
       </p:pic>
     </p:spTree>
-    <p:extLst>
-      <p:ext uri="{BB962C8B-B14F-4D97-AF65-F5344CB8AC3E}">
-        <p14:creationId xmlns:p14="http://schemas.microsoft.com/office/powerpoint/2010/main" val="1414785773"/>
-      </p:ext>
-    </p:extLst>
   </p:cSld>
   <p:clrMapOvr>
     <a:masterClrMapping/>
@@ -3552,7 +3561,7 @@
           <p:cNvPr id="2" name="Title 1">
             <a:extLst>
               <a:ext uri="{FF2B5EF4-FFF2-40B4-BE49-F238E27FC236}">
-                <a16:creationId xmlns:a16="http://schemas.microsoft.com/office/drawing/2014/main" id="{86490BF1-B63B-7E45-941B-C9DD6BA8053B}"/>
+                <a16:creationId xmlns:a16="http://schemas.microsoft.com/office/drawing/2014/main" xmlns="" id="{04780F8B-A673-5E46-B69D-90970069CAED}"/>
               </a:ext>
             </a:extLst>
           </p:cNvPr>
@@ -3563,14 +3572,19 @@
             <p:ph type="title"/>
           </p:nvPr>
         </p:nvSpPr>
-        <p:spPr/>
+        <p:spPr>
+          <a:xfrm>
+            <a:off x="2231136" y="258637"/>
+            <a:ext cx="7729728" cy="1188720"/>
+          </a:xfrm>
+        </p:spPr>
         <p:txBody>
           <a:bodyPr/>
           <a:lstStyle/>
           <a:p>
             <a:r>
               <a:rPr lang="fr-FR" dirty="0"/>
-              <a:t>Détermination des objets</a:t>
+              <a:t>SUJET</a:t>
             </a:r>
           </a:p>
         </p:txBody>
@@ -3580,7 +3594,7 @@
           <p:cNvPr id="5" name="Content Placeholder 4">
             <a:extLst>
               <a:ext uri="{FF2B5EF4-FFF2-40B4-BE49-F238E27FC236}">
-                <a16:creationId xmlns:a16="http://schemas.microsoft.com/office/drawing/2014/main" id="{0CC6E7C7-0838-9743-8D64-CEE5334604AF}"/>
+                <a16:creationId xmlns:a16="http://schemas.microsoft.com/office/drawing/2014/main" xmlns="" id="{C5BF60A7-1156-054E-B914-DC41B3F8E5BF}"/>
               </a:ext>
             </a:extLst>
           </p:cNvPr>
@@ -3599,15 +3613,15 @@
         </p:blipFill>
         <p:spPr>
           <a:xfrm>
-            <a:off x="2927443" y="2638425"/>
-            <a:ext cx="6337115" cy="3101975"/>
+            <a:off x="891251" y="2002421"/>
+            <a:ext cx="9722734" cy="4855580"/>
           </a:xfrm>
         </p:spPr>
       </p:pic>
     </p:spTree>
     <p:extLst>
       <p:ext uri="{BB962C8B-B14F-4D97-AF65-F5344CB8AC3E}">
-        <p14:creationId xmlns:p14="http://schemas.microsoft.com/office/powerpoint/2010/main" val="52420283"/>
+        <p14:creationId xmlns:p14="http://schemas.microsoft.com/office/powerpoint/2010/main" xmlns="" val="1414785773"/>
       </p:ext>
     </p:extLst>
   </p:cSld>
@@ -3639,7 +3653,7 @@
           <p:cNvPr id="2" name="Title 1">
             <a:extLst>
               <a:ext uri="{FF2B5EF4-FFF2-40B4-BE49-F238E27FC236}">
-                <a16:creationId xmlns:a16="http://schemas.microsoft.com/office/drawing/2014/main" id="{D5DA2DA2-12E1-0B4B-9682-3BF2AD26ED79}"/>
+                <a16:creationId xmlns:a16="http://schemas.microsoft.com/office/drawing/2014/main" xmlns="" id="{86490BF1-B63B-7E45-941B-C9DD6BA8053B}"/>
               </a:ext>
             </a:extLst>
           </p:cNvPr>
@@ -3655,101 +3669,46 @@
           <a:bodyPr/>
           <a:lstStyle/>
           <a:p>
-            <a:endParaRPr lang="fr-FR"/>
-          </a:p>
-        </p:txBody>
-      </p:sp>
-      <p:sp>
-        <p:nvSpPr>
-          <p:cNvPr id="3" name="Content Placeholder 2">
+            <a:r>
+              <a:rPr lang="fr-FR" dirty="0"/>
+              <a:t>Détermination des objets</a:t>
+            </a:r>
+          </a:p>
+        </p:txBody>
+      </p:sp>
+      <p:pic>
+        <p:nvPicPr>
+          <p:cNvPr id="5" name="Content Placeholder 4">
             <a:extLst>
               <a:ext uri="{FF2B5EF4-FFF2-40B4-BE49-F238E27FC236}">
-                <a16:creationId xmlns:a16="http://schemas.microsoft.com/office/drawing/2014/main" id="{11294F42-0770-7D4E-8762-4E1E0F59D5B0}"/>
+                <a16:creationId xmlns:a16="http://schemas.microsoft.com/office/drawing/2014/main" xmlns="" id="{0CC6E7C7-0838-9743-8D64-CEE5334604AF}"/>
               </a:ext>
             </a:extLst>
           </p:cNvPr>
-          <p:cNvSpPr>
-            <a:spLocks noGrp="1"/>
-          </p:cNvSpPr>
+          <p:cNvPicPr>
+            <a:picLocks noGrp="1" noChangeAspect="1"/>
+          </p:cNvPicPr>
           <p:nvPr>
             <p:ph idx="1"/>
           </p:nvPr>
-        </p:nvSpPr>
-        <p:spPr/>
-        <p:txBody>
-          <a:bodyPr>
-            <a:normAutofit fontScale="85000" lnSpcReduction="20000"/>
-          </a:bodyPr>
-          <a:lstStyle/>
-          <a:p>
-            <a:r>
-              <a:rPr lang="fr-FR" dirty="0"/>
-              <a:t>-	un utilisateur participe à un événement</a:t>
-            </a:r>
-          </a:p>
-          <a:p>
-            <a:r>
-              <a:rPr lang="fr-FR" dirty="0"/>
-              <a:t>-	un utilisateur gère un événement</a:t>
-            </a:r>
-          </a:p>
-          <a:p>
-            <a:r>
-              <a:rPr lang="fr-FR" dirty="0"/>
-              <a:t>-	un utilisateur publie une annonce</a:t>
-            </a:r>
-          </a:p>
-          <a:p>
-            <a:r>
-              <a:rPr lang="fr-FR" dirty="0"/>
-              <a:t>-	un utilisateur émet des commentaires</a:t>
-            </a:r>
-          </a:p>
-          <a:p>
-            <a:r>
-              <a:rPr lang="fr-FR" dirty="0"/>
-              <a:t>-	un utilisateur peut créer un calendrier</a:t>
-            </a:r>
-          </a:p>
-          <a:p>
-            <a:r>
-              <a:rPr lang="fr-FR" dirty="0"/>
-              <a:t>-	un commentaire concerne un événement</a:t>
-            </a:r>
-          </a:p>
-          <a:p>
-            <a:r>
-              <a:rPr lang="fr-FR" dirty="0"/>
-              <a:t>-	un événement est planifié dans calendrier</a:t>
-            </a:r>
-          </a:p>
-          <a:p>
-            <a:r>
-              <a:rPr lang="fr-FR" dirty="0"/>
-              <a:t>-	une annonce est faite pour un événement</a:t>
-            </a:r>
-          </a:p>
-          <a:p>
-            <a:r>
-              <a:rPr lang="fr-FR" dirty="0"/>
-              <a:t>-	un utilisateur peut rédiger une notification</a:t>
-            </a:r>
-          </a:p>
-          <a:p>
-            <a:r>
-              <a:rPr lang="fr-FR" dirty="0"/>
-              <a:t>-	une notification fait référence à un événement</a:t>
-            </a:r>
-          </a:p>
-          <a:p>
-            <a:endParaRPr lang="fr-FR" dirty="0"/>
-          </a:p>
-        </p:txBody>
-      </p:sp>
+        </p:nvPicPr>
+        <p:blipFill>
+          <a:blip r:embed="rId2"/>
+          <a:stretch>
+            <a:fillRect/>
+          </a:stretch>
+        </p:blipFill>
+        <p:spPr>
+          <a:xfrm>
+            <a:off x="2927443" y="2638425"/>
+            <a:ext cx="6337115" cy="3101975"/>
+          </a:xfrm>
+        </p:spPr>
+      </p:pic>
     </p:spTree>
     <p:extLst>
       <p:ext uri="{BB962C8B-B14F-4D97-AF65-F5344CB8AC3E}">
-        <p14:creationId xmlns:p14="http://schemas.microsoft.com/office/powerpoint/2010/main" val="25530045"/>
+        <p14:creationId xmlns:p14="http://schemas.microsoft.com/office/powerpoint/2010/main" xmlns="" val="52420283"/>
       </p:ext>
     </p:extLst>
   </p:cSld>
@@ -3781,7 +3740,7 @@
           <p:cNvPr id="2" name="Title 1">
             <a:extLst>
               <a:ext uri="{FF2B5EF4-FFF2-40B4-BE49-F238E27FC236}">
-                <a16:creationId xmlns:a16="http://schemas.microsoft.com/office/drawing/2014/main" id="{F71E15BA-9FD1-BE46-8115-7C1BFF65ECD0}"/>
+                <a16:creationId xmlns:a16="http://schemas.microsoft.com/office/drawing/2014/main" xmlns="" id="{D5DA2DA2-12E1-0B4B-9682-3BF2AD26ED79}"/>
               </a:ext>
             </a:extLst>
           </p:cNvPr>
@@ -3797,46 +3756,101 @@
           <a:bodyPr/>
           <a:lstStyle/>
           <a:p>
-            <a:r>
-              <a:rPr lang="fr-FR" dirty="0"/>
-              <a:t>MODELE CONCEPTUEL DES DONNEES</a:t>
-            </a:r>
-          </a:p>
-        </p:txBody>
-      </p:sp>
-      <p:pic>
-        <p:nvPicPr>
-          <p:cNvPr id="5" name="Content Placeholder 4">
+            <a:endParaRPr lang="fr-FR"/>
+          </a:p>
+        </p:txBody>
+      </p:sp>
+      <p:sp>
+        <p:nvSpPr>
+          <p:cNvPr id="3" name="Content Placeholder 2">
             <a:extLst>
               <a:ext uri="{FF2B5EF4-FFF2-40B4-BE49-F238E27FC236}">
-                <a16:creationId xmlns:a16="http://schemas.microsoft.com/office/drawing/2014/main" id="{797B54F2-595C-194B-8F9D-DB6C9C375479}"/>
+                <a16:creationId xmlns:a16="http://schemas.microsoft.com/office/drawing/2014/main" xmlns="" id="{11294F42-0770-7D4E-8762-4E1E0F59D5B0}"/>
               </a:ext>
             </a:extLst>
           </p:cNvPr>
-          <p:cNvPicPr>
-            <a:picLocks noGrp="1" noChangeAspect="1"/>
-          </p:cNvPicPr>
+          <p:cNvSpPr>
+            <a:spLocks noGrp="1"/>
+          </p:cNvSpPr>
           <p:nvPr>
             <p:ph idx="1"/>
           </p:nvPr>
-        </p:nvPicPr>
-        <p:blipFill>
-          <a:blip r:embed="rId2"/>
-          <a:stretch>
-            <a:fillRect/>
-          </a:stretch>
-        </p:blipFill>
-        <p:spPr>
-          <a:xfrm>
-            <a:off x="3834922" y="2638425"/>
-            <a:ext cx="4522156" cy="3101975"/>
-          </a:xfrm>
-        </p:spPr>
-      </p:pic>
+        </p:nvSpPr>
+        <p:spPr/>
+        <p:txBody>
+          <a:bodyPr>
+            <a:normAutofit fontScale="85000" lnSpcReduction="20000"/>
+          </a:bodyPr>
+          <a:lstStyle/>
+          <a:p>
+            <a:r>
+              <a:rPr lang="fr-FR" dirty="0"/>
+              <a:t>-	un utilisateur participe à un événement</a:t>
+            </a:r>
+          </a:p>
+          <a:p>
+            <a:r>
+              <a:rPr lang="fr-FR" dirty="0"/>
+              <a:t>-	un utilisateur gère un événement</a:t>
+            </a:r>
+          </a:p>
+          <a:p>
+            <a:r>
+              <a:rPr lang="fr-FR" dirty="0"/>
+              <a:t>-	un utilisateur publie une annonce</a:t>
+            </a:r>
+          </a:p>
+          <a:p>
+            <a:r>
+              <a:rPr lang="fr-FR" dirty="0"/>
+              <a:t>-	un utilisateur émet des commentaires</a:t>
+            </a:r>
+          </a:p>
+          <a:p>
+            <a:r>
+              <a:rPr lang="fr-FR" dirty="0"/>
+              <a:t>-	un utilisateur peut créer un calendrier</a:t>
+            </a:r>
+          </a:p>
+          <a:p>
+            <a:r>
+              <a:rPr lang="fr-FR" dirty="0"/>
+              <a:t>-	un commentaire concerne un événement</a:t>
+            </a:r>
+          </a:p>
+          <a:p>
+            <a:r>
+              <a:rPr lang="fr-FR" dirty="0"/>
+              <a:t>-	un événement est planifié dans calendrier</a:t>
+            </a:r>
+          </a:p>
+          <a:p>
+            <a:r>
+              <a:rPr lang="fr-FR" dirty="0"/>
+              <a:t>-	une annonce est faite pour un événement</a:t>
+            </a:r>
+          </a:p>
+          <a:p>
+            <a:r>
+              <a:rPr lang="fr-FR" dirty="0"/>
+              <a:t>-	un utilisateur peut rédiger une notification</a:t>
+            </a:r>
+          </a:p>
+          <a:p>
+            <a:r>
+              <a:rPr lang="fr-FR" dirty="0"/>
+              <a:t>-	une notification fait référence à un événement</a:t>
+            </a:r>
+          </a:p>
+          <a:p>
+            <a:endParaRPr lang="fr-FR" dirty="0"/>
+          </a:p>
+        </p:txBody>
+      </p:sp>
     </p:spTree>
     <p:extLst>
       <p:ext uri="{BB962C8B-B14F-4D97-AF65-F5344CB8AC3E}">
-        <p14:creationId xmlns:p14="http://schemas.microsoft.com/office/powerpoint/2010/main" val="1051359540"/>
+        <p14:creationId xmlns:p14="http://schemas.microsoft.com/office/powerpoint/2010/main" xmlns="" val="25530045"/>
       </p:ext>
     </p:extLst>
   </p:cSld>
@@ -3868,7 +3882,7 @@
           <p:cNvPr id="2" name="Title 1">
             <a:extLst>
               <a:ext uri="{FF2B5EF4-FFF2-40B4-BE49-F238E27FC236}">
-                <a16:creationId xmlns:a16="http://schemas.microsoft.com/office/drawing/2014/main" id="{99DAFD96-A927-D249-B075-53A8E7C7B3E8}"/>
+                <a16:creationId xmlns:a16="http://schemas.microsoft.com/office/drawing/2014/main" xmlns="" id="{F71E15BA-9FD1-BE46-8115-7C1BFF65ECD0}"/>
               </a:ext>
             </a:extLst>
           </p:cNvPr>
@@ -3886,7 +3900,7 @@
           <a:p>
             <a:r>
               <a:rPr lang="fr-FR" dirty="0"/>
-              <a:t>MODEL PHYSIQUE DES DONNEES</a:t>
+              <a:t>MODELE CONCEPTUEL DES DONNEES</a:t>
             </a:r>
           </a:p>
         </p:txBody>
@@ -3896,7 +3910,7 @@
           <p:cNvPr id="5" name="Content Placeholder 4">
             <a:extLst>
               <a:ext uri="{FF2B5EF4-FFF2-40B4-BE49-F238E27FC236}">
-                <a16:creationId xmlns:a16="http://schemas.microsoft.com/office/drawing/2014/main" id="{18B913C3-54C3-6045-B017-9710E3E4B9DB}"/>
+                <a16:creationId xmlns:a16="http://schemas.microsoft.com/office/drawing/2014/main" xmlns="" id="{797B54F2-595C-194B-8F9D-DB6C9C375479}"/>
               </a:ext>
             </a:extLst>
           </p:cNvPr>
@@ -3915,15 +3929,15 @@
         </p:blipFill>
         <p:spPr>
           <a:xfrm>
-            <a:off x="3967901" y="2638425"/>
-            <a:ext cx="4256198" cy="3101975"/>
+            <a:off x="3834922" y="2638425"/>
+            <a:ext cx="4522156" cy="3101975"/>
           </a:xfrm>
         </p:spPr>
       </p:pic>
     </p:spTree>
     <p:extLst>
       <p:ext uri="{BB962C8B-B14F-4D97-AF65-F5344CB8AC3E}">
-        <p14:creationId xmlns:p14="http://schemas.microsoft.com/office/powerpoint/2010/main" val="1850693521"/>
+        <p14:creationId xmlns:p14="http://schemas.microsoft.com/office/powerpoint/2010/main" xmlns="" val="1051359540"/>
       </p:ext>
     </p:extLst>
   </p:cSld>
@@ -3955,7 +3969,94 @@
           <p:cNvPr id="2" name="Title 1">
             <a:extLst>
               <a:ext uri="{FF2B5EF4-FFF2-40B4-BE49-F238E27FC236}">
-                <a16:creationId xmlns:a16="http://schemas.microsoft.com/office/drawing/2014/main" id="{B56CEA0A-458F-D24F-B519-06A124F4FBB1}"/>
+                <a16:creationId xmlns:a16="http://schemas.microsoft.com/office/drawing/2014/main" xmlns="" id="{99DAFD96-A927-D249-B075-53A8E7C7B3E8}"/>
+              </a:ext>
+            </a:extLst>
+          </p:cNvPr>
+          <p:cNvSpPr>
+            <a:spLocks noGrp="1"/>
+          </p:cNvSpPr>
+          <p:nvPr>
+            <p:ph type="title"/>
+          </p:nvPr>
+        </p:nvSpPr>
+        <p:spPr/>
+        <p:txBody>
+          <a:bodyPr/>
+          <a:lstStyle/>
+          <a:p>
+            <a:r>
+              <a:rPr lang="fr-FR" dirty="0"/>
+              <a:t>MODEL PHYSIQUE DES DONNEES</a:t>
+            </a:r>
+          </a:p>
+        </p:txBody>
+      </p:sp>
+      <p:pic>
+        <p:nvPicPr>
+          <p:cNvPr id="5" name="Content Placeholder 4">
+            <a:extLst>
+              <a:ext uri="{FF2B5EF4-FFF2-40B4-BE49-F238E27FC236}">
+                <a16:creationId xmlns:a16="http://schemas.microsoft.com/office/drawing/2014/main" xmlns="" id="{18B913C3-54C3-6045-B017-9710E3E4B9DB}"/>
+              </a:ext>
+            </a:extLst>
+          </p:cNvPr>
+          <p:cNvPicPr>
+            <a:picLocks noGrp="1" noChangeAspect="1"/>
+          </p:cNvPicPr>
+          <p:nvPr>
+            <p:ph idx="1"/>
+          </p:nvPr>
+        </p:nvPicPr>
+        <p:blipFill>
+          <a:blip r:embed="rId2"/>
+          <a:stretch>
+            <a:fillRect/>
+          </a:stretch>
+        </p:blipFill>
+        <p:spPr>
+          <a:xfrm>
+            <a:off x="3967901" y="2638425"/>
+            <a:ext cx="4256198" cy="3101975"/>
+          </a:xfrm>
+        </p:spPr>
+      </p:pic>
+    </p:spTree>
+    <p:extLst>
+      <p:ext uri="{BB962C8B-B14F-4D97-AF65-F5344CB8AC3E}">
+        <p14:creationId xmlns:p14="http://schemas.microsoft.com/office/powerpoint/2010/main" xmlns="" val="1850693521"/>
+      </p:ext>
+    </p:extLst>
+  </p:cSld>
+  <p:clrMapOvr>
+    <a:masterClrMapping/>
+  </p:clrMapOvr>
+</p:sld>
+</file>
+
+<file path=ppt/slides/slide9.xml><?xml version="1.0" encoding="utf-8"?>
+<p:sld xmlns:a="http://schemas.openxmlformats.org/drawingml/2006/main" xmlns:r="http://schemas.openxmlformats.org/officeDocument/2006/relationships" xmlns:p="http://schemas.openxmlformats.org/presentationml/2006/main">
+  <p:cSld>
+    <p:spTree>
+      <p:nvGrpSpPr>
+        <p:cNvPr id="1" name=""/>
+        <p:cNvGrpSpPr/>
+        <p:nvPr/>
+      </p:nvGrpSpPr>
+      <p:grpSpPr>
+        <a:xfrm>
+          <a:off x="0" y="0"/>
+          <a:ext cx="0" cy="0"/>
+          <a:chOff x="0" y="0"/>
+          <a:chExt cx="0" cy="0"/>
+        </a:xfrm>
+      </p:grpSpPr>
+      <p:sp>
+        <p:nvSpPr>
+          <p:cNvPr id="2" name="Title 1">
+            <a:extLst>
+              <a:ext uri="{FF2B5EF4-FFF2-40B4-BE49-F238E27FC236}">
+                <a16:creationId xmlns:a16="http://schemas.microsoft.com/office/drawing/2014/main" xmlns="" id="{B56CEA0A-458F-D24F-B519-06A124F4FBB1}"/>
               </a:ext>
             </a:extLst>
           </p:cNvPr>
@@ -3988,7 +4089,7 @@
           <p:cNvPr id="5" name="Content Placeholder 4">
             <a:extLst>
               <a:ext uri="{FF2B5EF4-FFF2-40B4-BE49-F238E27FC236}">
-                <a16:creationId xmlns:a16="http://schemas.microsoft.com/office/drawing/2014/main" id="{D48F51CF-F980-5541-A817-3747CE7D956A}"/>
+                <a16:creationId xmlns:a16="http://schemas.microsoft.com/office/drawing/2014/main" xmlns="" id="{D48F51CF-F980-5541-A817-3747CE7D956A}"/>
               </a:ext>
             </a:extLst>
           </p:cNvPr>
@@ -4015,7 +4116,7 @@
     </p:spTree>
     <p:extLst>
       <p:ext uri="{BB962C8B-B14F-4D97-AF65-F5344CB8AC3E}">
-        <p14:creationId xmlns:p14="http://schemas.microsoft.com/office/powerpoint/2010/main" val="1722852946"/>
+        <p14:creationId xmlns:p14="http://schemas.microsoft.com/office/powerpoint/2010/main" xmlns="" val="1722852946"/>
       </p:ext>
     </p:extLst>
   </p:cSld>
@@ -4068,7 +4169,7 @@
     </a:clrScheme>
     <a:fontScheme name="Parcel">
       <a:majorFont>
-        <a:latin typeface="Gill Sans MT" panose="020B0502020104020203"/>
+        <a:latin typeface="Gill Sans MT"/>
         <a:ea typeface=""/>
         <a:cs typeface=""/>
         <a:font script="Grek" typeface="Corbel"/>
@@ -4105,7 +4206,7 @@
         <a:font script="Geor" typeface="Sylfaen"/>
       </a:majorFont>
       <a:minorFont>
-        <a:latin typeface="Gill Sans MT" panose="020B0502020104020203"/>
+        <a:latin typeface="Gill Sans MT"/>
         <a:ea typeface=""/>
         <a:cs typeface=""/>
         <a:font script="Grek" typeface="Corbel"/>
@@ -4279,7 +4380,7 @@
   <a:extraClrSchemeLst/>
   <a:extLst>
     <a:ext uri="{05A4C25C-085E-4340-85A3-A5531E510DB2}">
-      <thm15:themeFamily xmlns:thm15="http://schemas.microsoft.com/office/thememl/2012/main" name="Parcel" id="{8BEC4385-4EB9-4D53-BFB5-0EA123736B6D}" vid="{4DB32801-28C0-48B0-8C1D-A9A58613615A}"/>
+      <thm15:themeFamily xmlns:thm15="http://schemas.microsoft.com/office/thememl/2012/main" xmlns="" name="Parcel" id="{8BEC4385-4EB9-4D53-BFB5-0EA123736B6D}" vid="{4DB32801-28C0-48B0-8C1D-A9A58613615A}"/>
     </a:ext>
   </a:extLst>
 </a:theme>

</xml_diff>